<commit_message>
chore(pptx_generator): update `template.pptx` file in templates folder
</commit_message>
<xml_diff>
--- a/lib/pptx_generator/templates/template.pptx
+++ b/lib/pptx_generator/templates/template.pptx
@@ -104,6 +104,11 @@
       </a:defRPr>
     </a:lvl9pPr>
   </p:defaultTextStyle>
+  <p:extLst>
+    <p:ext uri="{EFAFB233-063F-42B5-8137-9DF3F51BA10A}">
+      <p15:sldGuideLst xmlns:p15="http://schemas.microsoft.com/office/powerpoint/2012/main"/>
+    </p:ext>
+  </p:extLst>
 </p:presentation>
 </file>
 
@@ -112,12 +117,12 @@
   <pc:docChgLst>
     <pc:chgData name="Yoshitaka Okada" userId="86f1a29df5c25d6e" providerId="LiveId" clId="{F2E773DD-70F0-4DDE-804D-D555AF7086E8}"/>
     <pc:docChg chg="modSld">
-      <pc:chgData name="Yoshitaka Okada" userId="86f1a29df5c25d6e" providerId="LiveId" clId="{F2E773DD-70F0-4DDE-804D-D555AF7086E8}" dt="2025-10-18T05:46:21.790" v="11" actId="962"/>
+      <pc:chgData name="Yoshitaka Okada" userId="86f1a29df5c25d6e" providerId="LiveId" clId="{F2E773DD-70F0-4DDE-804D-D555AF7086E8}" dt="2025-10-18T14:00:49.519" v="12" actId="13822"/>
       <pc:docMkLst>
         <pc:docMk/>
       </pc:docMkLst>
       <pc:sldChg chg="addSp delSp modSp mod">
-        <pc:chgData name="Yoshitaka Okada" userId="86f1a29df5c25d6e" providerId="LiveId" clId="{F2E773DD-70F0-4DDE-804D-D555AF7086E8}" dt="2025-10-18T05:46:21.790" v="11" actId="962"/>
+        <pc:chgData name="Yoshitaka Okada" userId="86f1a29df5c25d6e" providerId="LiveId" clId="{F2E773DD-70F0-4DDE-804D-D555AF7086E8}" dt="2025-10-18T14:00:49.519" v="12" actId="13822"/>
         <pc:sldMkLst>
           <pc:docMk/>
           <pc:sldMk cId="2963905670" sldId="256"/>
@@ -139,7 +144,7 @@
           </ac:spMkLst>
         </pc:spChg>
         <pc:spChg chg="add mod">
-          <ac:chgData name="Yoshitaka Okada" userId="86f1a29df5c25d6e" providerId="LiveId" clId="{F2E773DD-70F0-4DDE-804D-D555AF7086E8}" dt="2025-10-18T05:46:21.790" v="11" actId="962"/>
+          <ac:chgData name="Yoshitaka Okada" userId="86f1a29df5c25d6e" providerId="LiveId" clId="{F2E773DD-70F0-4DDE-804D-D555AF7086E8}" dt="2025-10-18T14:00:49.519" v="12" actId="13822"/>
           <ac:spMkLst>
             <pc:docMk/>
             <pc:sldMk cId="2963905670" sldId="256"/>
@@ -3674,8 +3679,21 @@
           <a:prstGeom prst="rect">
             <a:avLst/>
           </a:prstGeom>
-          <a:noFill/>
         </p:spPr>
+        <p:style>
+          <a:lnRef idx="3">
+            <a:schemeClr val="lt1"/>
+          </a:lnRef>
+          <a:fillRef idx="1">
+            <a:schemeClr val="accent1"/>
+          </a:fillRef>
+          <a:effectRef idx="1">
+            <a:schemeClr val="accent1"/>
+          </a:effectRef>
+          <a:fontRef idx="minor">
+            <a:schemeClr val="lt1"/>
+          </a:fontRef>
+        </p:style>
         <p:txBody>
           <a:bodyPr wrap="square" rtlCol="0">
             <a:spAutoFit/>

</xml_diff>

<commit_message>
feat(pptx_generator): integrate Markdown support for enhanced slide customization, update `sample_t1.py` with mapping and structured parsing logic
</commit_message>
<xml_diff>
--- a/lib/pptx_generator/templates/template.pptx
+++ b/lib/pptx_generator/templates/template.pptx
@@ -117,16 +117,32 @@
   <pc:docChgLst>
     <pc:chgData name="Yoshitaka Okada" userId="86f1a29df5c25d6e" providerId="LiveId" clId="{F2E773DD-70F0-4DDE-804D-D555AF7086E8}"/>
     <pc:docChg chg="modSld">
-      <pc:chgData name="Yoshitaka Okada" userId="86f1a29df5c25d6e" providerId="LiveId" clId="{F2E773DD-70F0-4DDE-804D-D555AF7086E8}" dt="2025-10-18T14:00:49.519" v="12" actId="13822"/>
+      <pc:chgData name="Yoshitaka Okada" userId="86f1a29df5c25d6e" providerId="LiveId" clId="{F2E773DD-70F0-4DDE-804D-D555AF7086E8}" dt="2025-10-19T05:42:48.750" v="48" actId="962"/>
       <pc:docMkLst>
         <pc:docMk/>
       </pc:docMkLst>
       <pc:sldChg chg="addSp delSp modSp mod">
-        <pc:chgData name="Yoshitaka Okada" userId="86f1a29df5c25d6e" providerId="LiveId" clId="{F2E773DD-70F0-4DDE-804D-D555AF7086E8}" dt="2025-10-18T14:00:49.519" v="12" actId="13822"/>
+        <pc:chgData name="Yoshitaka Okada" userId="86f1a29df5c25d6e" providerId="LiveId" clId="{F2E773DD-70F0-4DDE-804D-D555AF7086E8}" dt="2025-10-19T05:42:48.750" v="48" actId="962"/>
         <pc:sldMkLst>
           <pc:docMk/>
           <pc:sldMk cId="2963905670" sldId="256"/>
         </pc:sldMkLst>
+        <pc:spChg chg="add mod">
+          <ac:chgData name="Yoshitaka Okada" userId="86f1a29df5c25d6e" providerId="LiveId" clId="{F2E773DD-70F0-4DDE-804D-D555AF7086E8}" dt="2025-10-19T05:37:01.913" v="39" actId="20577"/>
+          <ac:spMkLst>
+            <pc:docMk/>
+            <pc:sldMk cId="2963905670" sldId="256"/>
+            <ac:spMk id="3" creationId="{58CB05D5-F9A3-95FA-470B-D0D2228553D1}"/>
+          </ac:spMkLst>
+        </pc:spChg>
+        <pc:spChg chg="add mod ord">
+          <ac:chgData name="Yoshitaka Okada" userId="86f1a29df5c25d6e" providerId="LiveId" clId="{F2E773DD-70F0-4DDE-804D-D555AF7086E8}" dt="2025-10-19T05:37:35.453" v="46" actId="20577"/>
+          <ac:spMkLst>
+            <pc:docMk/>
+            <pc:sldMk cId="2963905670" sldId="256"/>
+            <ac:spMk id="4" creationId="{119CC131-BD8B-B7C6-EDBC-DC62B574411A}"/>
+          </ac:spMkLst>
+        </pc:spChg>
         <pc:spChg chg="add del mod">
           <ac:chgData name="Yoshitaka Okada" userId="86f1a29df5c25d6e" providerId="LiveId" clId="{F2E773DD-70F0-4DDE-804D-D555AF7086E8}" dt="2025-10-18T05:43:57.070" v="2"/>
           <ac:spMkLst>
@@ -143,14 +159,22 @@
             <ac:spMk id="5" creationId="{3FE818AE-985F-CDAC-4CC2-E479AABC2399}"/>
           </ac:spMkLst>
         </pc:spChg>
-        <pc:spChg chg="add mod">
-          <ac:chgData name="Yoshitaka Okada" userId="86f1a29df5c25d6e" providerId="LiveId" clId="{F2E773DD-70F0-4DDE-804D-D555AF7086E8}" dt="2025-10-18T14:00:49.519" v="12" actId="13822"/>
+        <pc:spChg chg="add mod ord">
+          <ac:chgData name="Yoshitaka Okada" userId="86f1a29df5c25d6e" providerId="LiveId" clId="{F2E773DD-70F0-4DDE-804D-D555AF7086E8}" dt="2025-10-19T05:36:41.126" v="34" actId="13244"/>
           <ac:spMkLst>
             <pc:docMk/>
             <pc:sldMk cId="2963905670" sldId="256"/>
             <ac:spMk id="6" creationId="{FA4804F2-9AFB-CE09-9CA7-BAAFB15AC711}"/>
           </ac:spMkLst>
         </pc:spChg>
+        <pc:graphicFrameChg chg="add mod modGraphic">
+          <ac:chgData name="Yoshitaka Okada" userId="86f1a29df5c25d6e" providerId="LiveId" clId="{F2E773DD-70F0-4DDE-804D-D555AF7086E8}" dt="2025-10-19T05:42:48.750" v="48" actId="962"/>
+          <ac:graphicFrameMkLst>
+            <pc:docMk/>
+            <pc:sldMk cId="2963905670" sldId="256"/>
+            <ac:graphicFrameMk id="2" creationId="{94BBEDE2-6DE3-76FD-76B1-D9A08AF15C30}"/>
+          </ac:graphicFrameMkLst>
+        </pc:graphicFrameChg>
       </pc:sldChg>
     </pc:docChg>
   </pc:docChgLst>
@@ -304,7 +328,7 @@
           <a:p>
             <a:fld id="{906D1B29-FA23-4BA5-A14C-2A20BC639514}" type="datetimeFigureOut">
               <a:rPr kumimoji="1" lang="ja-JP" altLang="en-US" smtClean="0"/>
-              <a:t>2025/10/18</a:t>
+              <a:t>2025/10/19</a:t>
             </a:fld>
             <a:endParaRPr kumimoji="1" lang="ja-JP" altLang="en-US"/>
           </a:p>
@@ -534,7 +558,7 @@
           <a:p>
             <a:fld id="{906D1B29-FA23-4BA5-A14C-2A20BC639514}" type="datetimeFigureOut">
               <a:rPr kumimoji="1" lang="ja-JP" altLang="en-US" smtClean="0"/>
-              <a:t>2025/10/18</a:t>
+              <a:t>2025/10/19</a:t>
             </a:fld>
             <a:endParaRPr kumimoji="1" lang="ja-JP" altLang="en-US"/>
           </a:p>
@@ -774,7 +798,7 @@
           <a:p>
             <a:fld id="{906D1B29-FA23-4BA5-A14C-2A20BC639514}" type="datetimeFigureOut">
               <a:rPr kumimoji="1" lang="ja-JP" altLang="en-US" smtClean="0"/>
-              <a:t>2025/10/18</a:t>
+              <a:t>2025/10/19</a:t>
             </a:fld>
             <a:endParaRPr kumimoji="1" lang="ja-JP" altLang="en-US"/>
           </a:p>
@@ -1004,7 +1028,7 @@
           <a:p>
             <a:fld id="{906D1B29-FA23-4BA5-A14C-2A20BC639514}" type="datetimeFigureOut">
               <a:rPr kumimoji="1" lang="ja-JP" altLang="en-US" smtClean="0"/>
-              <a:t>2025/10/18</a:t>
+              <a:t>2025/10/19</a:t>
             </a:fld>
             <a:endParaRPr kumimoji="1" lang="ja-JP" altLang="en-US"/>
           </a:p>
@@ -1279,7 +1303,7 @@
           <a:p>
             <a:fld id="{906D1B29-FA23-4BA5-A14C-2A20BC639514}" type="datetimeFigureOut">
               <a:rPr kumimoji="1" lang="ja-JP" altLang="en-US" smtClean="0"/>
-              <a:t>2025/10/18</a:t>
+              <a:t>2025/10/19</a:t>
             </a:fld>
             <a:endParaRPr kumimoji="1" lang="ja-JP" altLang="en-US"/>
           </a:p>
@@ -1608,7 +1632,7 @@
           <a:p>
             <a:fld id="{906D1B29-FA23-4BA5-A14C-2A20BC639514}" type="datetimeFigureOut">
               <a:rPr kumimoji="1" lang="ja-JP" altLang="en-US" smtClean="0"/>
-              <a:t>2025/10/18</a:t>
+              <a:t>2025/10/19</a:t>
             </a:fld>
             <a:endParaRPr kumimoji="1" lang="ja-JP" altLang="en-US"/>
           </a:p>
@@ -2084,7 +2108,7 @@
           <a:p>
             <a:fld id="{906D1B29-FA23-4BA5-A14C-2A20BC639514}" type="datetimeFigureOut">
               <a:rPr kumimoji="1" lang="ja-JP" altLang="en-US" smtClean="0"/>
-              <a:t>2025/10/18</a:t>
+              <a:t>2025/10/19</a:t>
             </a:fld>
             <a:endParaRPr kumimoji="1" lang="ja-JP" altLang="en-US"/>
           </a:p>
@@ -2225,7 +2249,7 @@
           <a:p>
             <a:fld id="{906D1B29-FA23-4BA5-A14C-2A20BC639514}" type="datetimeFigureOut">
               <a:rPr kumimoji="1" lang="ja-JP" altLang="en-US" smtClean="0"/>
-              <a:t>2025/10/18</a:t>
+              <a:t>2025/10/19</a:t>
             </a:fld>
             <a:endParaRPr kumimoji="1" lang="ja-JP" altLang="en-US"/>
           </a:p>
@@ -2338,7 +2362,7 @@
           <a:p>
             <a:fld id="{906D1B29-FA23-4BA5-A14C-2A20BC639514}" type="datetimeFigureOut">
               <a:rPr kumimoji="1" lang="ja-JP" altLang="en-US" smtClean="0"/>
-              <a:t>2025/10/18</a:t>
+              <a:t>2025/10/19</a:t>
             </a:fld>
             <a:endParaRPr kumimoji="1" lang="ja-JP" altLang="en-US"/>
           </a:p>
@@ -2681,7 +2705,7 @@
           <a:p>
             <a:fld id="{906D1B29-FA23-4BA5-A14C-2A20BC639514}" type="datetimeFigureOut">
               <a:rPr kumimoji="1" lang="ja-JP" altLang="en-US" smtClean="0"/>
-              <a:t>2025/10/18</a:t>
+              <a:t>2025/10/19</a:t>
             </a:fld>
             <a:endParaRPr kumimoji="1" lang="ja-JP" altLang="en-US"/>
           </a:p>
@@ -2969,7 +2993,7 @@
           <a:p>
             <a:fld id="{906D1B29-FA23-4BA5-A14C-2A20BC639514}" type="datetimeFigureOut">
               <a:rPr kumimoji="1" lang="ja-JP" altLang="en-US" smtClean="0"/>
-              <a:t>2025/10/18</a:t>
+              <a:t>2025/10/19</a:t>
             </a:fld>
             <a:endParaRPr kumimoji="1" lang="ja-JP" altLang="en-US"/>
           </a:p>
@@ -3242,7 +3266,7 @@
           <a:p>
             <a:fld id="{906D1B29-FA23-4BA5-A14C-2A20BC639514}" type="datetimeFigureOut">
               <a:rPr kumimoji="1" lang="ja-JP" altLang="en-US" smtClean="0"/>
-              <a:t>2025/10/18</a:t>
+              <a:t>2025/10/19</a:t>
             </a:fld>
             <a:endParaRPr kumimoji="1" lang="ja-JP" altLang="en-US"/>
           </a:p>
@@ -3659,12 +3683,143 @@
           <a:chExt cx="0" cy="0"/>
         </a:xfrm>
       </p:grpSpPr>
-      <p:sp>
-        <p:nvSpPr>
-          <p:cNvPr id="6" name="TextBox1">
-            <a:extLst>
-              <a:ext uri="{FF2B5EF4-FFF2-40B4-BE49-F238E27FC236}">
-                <a16:creationId xmlns:a16="http://schemas.microsoft.com/office/drawing/2014/main" id="{FA4804F2-9AFB-CE09-9CA7-BAAFB15AC711}"/>
+      <p:graphicFrame>
+        <p:nvGraphicFramePr>
+          <p:cNvPr id="2" name="Table">
+            <a:extLst>
+              <a:ext uri="{FF2B5EF4-FFF2-40B4-BE49-F238E27FC236}">
+                <a16:creationId xmlns:a16="http://schemas.microsoft.com/office/drawing/2014/main" id="{94BBEDE2-6DE3-76FD-76B1-D9A08AF15C30}"/>
+              </a:ext>
+            </a:extLst>
+          </p:cNvPr>
+          <p:cNvGraphicFramePr>
+            <a:graphicFrameLocks noGrp="1"/>
+          </p:cNvGraphicFramePr>
+          <p:nvPr>
+            <p:extLst>
+              <p:ext uri="{D42A27DB-BD31-4B8C-83A1-F6EECF244321}">
+                <p14:modId xmlns:p14="http://schemas.microsoft.com/office/powerpoint/2010/main" val="3560313703"/>
+              </p:ext>
+            </p:extLst>
+          </p:nvPr>
+        </p:nvGraphicFramePr>
+        <p:xfrm>
+          <a:off x="5768651" y="1668136"/>
+          <a:ext cx="6087188" cy="1112520"/>
+        </p:xfrm>
+        <a:graphic>
+          <a:graphicData uri="http://schemas.openxmlformats.org/drawingml/2006/table">
+            <a:tbl>
+              <a:tblPr firstRow="1" bandRow="1">
+                <a:tableStyleId>{5C22544A-7EE6-4342-B048-85BDC9FD1C3A}</a:tableStyleId>
+              </a:tblPr>
+              <a:tblGrid>
+                <a:gridCol w="3043594">
+                  <a:extLst>
+                    <a:ext uri="{9D8B030D-6E8A-4147-A177-3AD203B41FA5}">
+                      <a16:colId xmlns:a16="http://schemas.microsoft.com/office/drawing/2014/main" val="2304873298"/>
+                    </a:ext>
+                  </a:extLst>
+                </a:gridCol>
+                <a:gridCol w="3043594">
+                  <a:extLst>
+                    <a:ext uri="{9D8B030D-6E8A-4147-A177-3AD203B41FA5}">
+                      <a16:colId xmlns:a16="http://schemas.microsoft.com/office/drawing/2014/main" val="685788080"/>
+                    </a:ext>
+                  </a:extLst>
+                </a:gridCol>
+              </a:tblGrid>
+              <a:tr h="370840">
+                <a:tc>
+                  <a:txBody>
+                    <a:bodyPr/>
+                    <a:lstStyle/>
+                    <a:p>
+                      <a:endParaRPr kumimoji="1" lang="ja-JP" altLang="en-US" dirty="0"/>
+                    </a:p>
+                  </a:txBody>
+                  <a:tcPr/>
+                </a:tc>
+                <a:tc>
+                  <a:txBody>
+                    <a:bodyPr/>
+                    <a:lstStyle/>
+                    <a:p>
+                      <a:endParaRPr kumimoji="1" lang="ja-JP" altLang="en-US"/>
+                    </a:p>
+                  </a:txBody>
+                  <a:tcPr/>
+                </a:tc>
+                <a:extLst>
+                  <a:ext uri="{0D108BD9-81ED-4DB2-BD59-A6C34878D82A}">
+                    <a16:rowId xmlns:a16="http://schemas.microsoft.com/office/drawing/2014/main" val="1822784336"/>
+                  </a:ext>
+                </a:extLst>
+              </a:tr>
+              <a:tr h="370840">
+                <a:tc>
+                  <a:txBody>
+                    <a:bodyPr/>
+                    <a:lstStyle/>
+                    <a:p>
+                      <a:endParaRPr kumimoji="1" lang="ja-JP" altLang="en-US" dirty="0"/>
+                    </a:p>
+                  </a:txBody>
+                  <a:tcPr/>
+                </a:tc>
+                <a:tc>
+                  <a:txBody>
+                    <a:bodyPr/>
+                    <a:lstStyle/>
+                    <a:p>
+                      <a:endParaRPr kumimoji="1" lang="ja-JP" altLang="en-US" dirty="0"/>
+                    </a:p>
+                  </a:txBody>
+                  <a:tcPr/>
+                </a:tc>
+                <a:extLst>
+                  <a:ext uri="{0D108BD9-81ED-4DB2-BD59-A6C34878D82A}">
+                    <a16:rowId xmlns:a16="http://schemas.microsoft.com/office/drawing/2014/main" val="2481407144"/>
+                  </a:ext>
+                </a:extLst>
+              </a:tr>
+              <a:tr h="370840">
+                <a:tc>
+                  <a:txBody>
+                    <a:bodyPr/>
+                    <a:lstStyle/>
+                    <a:p>
+                      <a:endParaRPr kumimoji="1" lang="ja-JP" altLang="en-US" dirty="0"/>
+                    </a:p>
+                  </a:txBody>
+                  <a:tcPr/>
+                </a:tc>
+                <a:tc>
+                  <a:txBody>
+                    <a:bodyPr/>
+                    <a:lstStyle/>
+                    <a:p>
+                      <a:endParaRPr kumimoji="1" lang="ja-JP" altLang="en-US" dirty="0"/>
+                    </a:p>
+                  </a:txBody>
+                  <a:tcPr/>
+                </a:tc>
+                <a:extLst>
+                  <a:ext uri="{0D108BD9-81ED-4DB2-BD59-A6C34878D82A}">
+                    <a16:rowId xmlns:a16="http://schemas.microsoft.com/office/drawing/2014/main" val="307438948"/>
+                  </a:ext>
+                </a:extLst>
+              </a:tr>
+            </a:tbl>
+          </a:graphicData>
+        </a:graphic>
+      </p:graphicFrame>
+      <p:sp>
+        <p:nvSpPr>
+          <p:cNvPr id="4" name="BulletList">
+            <a:extLst>
+              <a:ext uri="{FF2B5EF4-FFF2-40B4-BE49-F238E27FC236}">
+                <a16:creationId xmlns:a16="http://schemas.microsoft.com/office/drawing/2014/main" id="{119CC131-BD8B-B7C6-EDBC-DC62B574411A}"/>
               </a:ext>
             </a:extLst>
           </p:cNvPr>
@@ -3673,7 +3828,104 @@
         </p:nvSpPr>
         <p:spPr>
           <a:xfrm>
-            <a:off x="2122714" y="1581539"/>
+            <a:off x="968829" y="3621660"/>
+            <a:ext cx="4144347" cy="369332"/>
+          </a:xfrm>
+          <a:prstGeom prst="rect">
+            <a:avLst/>
+          </a:prstGeom>
+        </p:spPr>
+        <p:style>
+          <a:lnRef idx="3">
+            <a:schemeClr val="lt1"/>
+          </a:lnRef>
+          <a:fillRef idx="1">
+            <a:schemeClr val="accent1"/>
+          </a:fillRef>
+          <a:effectRef idx="1">
+            <a:schemeClr val="accent1"/>
+          </a:effectRef>
+          <a:fontRef idx="minor">
+            <a:schemeClr val="lt1"/>
+          </a:fontRef>
+        </p:style>
+        <p:txBody>
+          <a:bodyPr wrap="square" rtlCol="0">
+            <a:spAutoFit/>
+          </a:bodyPr>
+          <a:lstStyle/>
+          <a:p>
+            <a:r>
+              <a:rPr lang="en-US" altLang="ja-JP" dirty="0" err="1"/>
+              <a:t>BulletList</a:t>
+            </a:r>
+            <a:endParaRPr lang="en-US" altLang="ja-JP" dirty="0"/>
+          </a:p>
+        </p:txBody>
+      </p:sp>
+      <p:sp>
+        <p:nvSpPr>
+          <p:cNvPr id="3" name="Paragraphs">
+            <a:extLst>
+              <a:ext uri="{FF2B5EF4-FFF2-40B4-BE49-F238E27FC236}">
+                <a16:creationId xmlns:a16="http://schemas.microsoft.com/office/drawing/2014/main" id="{58CB05D5-F9A3-95FA-470B-D0D2228553D1}"/>
+              </a:ext>
+            </a:extLst>
+          </p:cNvPr>
+          <p:cNvSpPr txBox="1"/>
+          <p:nvPr/>
+        </p:nvSpPr>
+        <p:spPr>
+          <a:xfrm>
+            <a:off x="968829" y="1855064"/>
+            <a:ext cx="4144347" cy="369332"/>
+          </a:xfrm>
+          <a:prstGeom prst="rect">
+            <a:avLst/>
+          </a:prstGeom>
+        </p:spPr>
+        <p:style>
+          <a:lnRef idx="3">
+            <a:schemeClr val="lt1"/>
+          </a:lnRef>
+          <a:fillRef idx="1">
+            <a:schemeClr val="accent1"/>
+          </a:fillRef>
+          <a:effectRef idx="1">
+            <a:schemeClr val="accent1"/>
+          </a:effectRef>
+          <a:fontRef idx="minor">
+            <a:schemeClr val="lt1"/>
+          </a:fontRef>
+        </p:style>
+        <p:txBody>
+          <a:bodyPr wrap="square" rtlCol="0">
+            <a:spAutoFit/>
+          </a:bodyPr>
+          <a:lstStyle/>
+          <a:p>
+            <a:r>
+              <a:rPr lang="en-US" altLang="ja-JP" dirty="0"/>
+              <a:t>Paragraphs</a:t>
+            </a:r>
+          </a:p>
+        </p:txBody>
+      </p:sp>
+      <p:sp>
+        <p:nvSpPr>
+          <p:cNvPr id="6" name="Title">
+            <a:extLst>
+              <a:ext uri="{FF2B5EF4-FFF2-40B4-BE49-F238E27FC236}">
+                <a16:creationId xmlns:a16="http://schemas.microsoft.com/office/drawing/2014/main" id="{FA4804F2-9AFB-CE09-9CA7-BAAFB15AC711}"/>
+              </a:ext>
+            </a:extLst>
+          </p:cNvPr>
+          <p:cNvSpPr txBox="1"/>
+          <p:nvPr/>
+        </p:nvSpPr>
+        <p:spPr>
+          <a:xfrm>
+            <a:off x="1441580" y="765111"/>
             <a:ext cx="8654143" cy="369332"/>
           </a:xfrm>
           <a:prstGeom prst="rect">
@@ -3701,8 +3953,8 @@
           <a:lstStyle/>
           <a:p>
             <a:r>
-              <a:rPr lang="en-US" altLang="ja-JP" dirty="0"/>
-              <a:t>TextBox1</a:t>
+              <a:rPr kumimoji="1" lang="en-US" altLang="ja-JP" dirty="0"/>
+              <a:t>Title</a:t>
             </a:r>
             <a:endParaRPr kumimoji="1" lang="ja-JP" altLang="en-US" dirty="0"/>
           </a:p>

</xml_diff>